<commit_message>
Added new android studio project
</commit_message>
<xml_diff>
--- a/2019 DOCS/Lecture Two.pptx
+++ b/2019 DOCS/Lecture Two.pptx
@@ -5980,15 +5980,7 @@
             </a:pPr>
             <a:r>
               <a:rPr lang="en-US" dirty="0"/>
-              <a:t>Now that </a:t>
-            </a:r>
-            <a:r>
-              <a:rPr lang="en-US"/>
-              <a:t>we have all </a:t>
-            </a:r>
-            <a:r>
-              <a:rPr lang="en-US" dirty="0"/>
-              <a:t>our development tools in place, let’s create our first android application in Android Studio.</a:t>
+              <a:t>Now that we have all our development tools in place, let’s create our first android application in Android Studio.</a:t>
             </a:r>
           </a:p>
           <a:p>
@@ -6963,7 +6955,15 @@
             </a:pPr>
             <a:r>
               <a:rPr lang="en-US" dirty="0"/>
-              <a:t>(In not less than 200 words)</a:t>
+              <a:t>(In not less </a:t>
+            </a:r>
+            <a:r>
+              <a:rPr lang="en-US"/>
+              <a:t>than 100 </a:t>
+            </a:r>
+            <a:r>
+              <a:rPr lang="en-US" dirty="0"/>
+              <a:t>words)</a:t>
             </a:r>
           </a:p>
           <a:p>

</xml_diff>